<commit_message>
Add some final notes
</commit_message>
<xml_diff>
--- a/Multi-Level Debugging for Cython.pptx
+++ b/Multi-Level Debugging for Cython.pptx
@@ -5,7 +5,7 @@
     <p:sldMasterId id="2147483720" r:id="rId1"/>
   </p:sldMasterIdLst>
   <p:notesMasterIdLst>
-    <p:notesMasterId r:id="rId22"/>
+    <p:notesMasterId r:id="rId23"/>
   </p:notesMasterIdLst>
   <p:sldIdLst>
     <p:sldId id="256" r:id="rId2"/>
@@ -27,7 +27,8 @@
     <p:sldId id="281" r:id="rId18"/>
     <p:sldId id="284" r:id="rId19"/>
     <p:sldId id="280" r:id="rId20"/>
-    <p:sldId id="271" r:id="rId21"/>
+    <p:sldId id="301" r:id="rId21"/>
+    <p:sldId id="271" r:id="rId22"/>
   </p:sldIdLst>
   <p:sldSz cx="9144000" cy="6858000" type="screen4x3"/>
   <p:notesSz cx="6858000" cy="9144000"/>
@@ -150,6 +151,7 @@
             <p14:sldId id="281"/>
             <p14:sldId id="284"/>
             <p14:sldId id="280"/>
+            <p14:sldId id="301"/>
             <p14:sldId id="271"/>
           </p14:sldIdLst>
         </p14:section>
@@ -241,7 +243,7 @@
           <a:p>
             <a:fld id="{7B828FF2-D90A-489D-867E-862A66822F8F}" type="datetimeFigureOut">
               <a:rPr lang="en-US" smtClean="0"/>
-              <a:t>3/28/11</a:t>
+              <a:t>3/29/11</a:t>
             </a:fld>
             <a:endParaRPr lang="en-US"/>
           </a:p>
@@ -1093,7 +1095,7 @@
           <a:p>
             <a:fld id="{3422F140-FF59-4402-B4B9-5DBFDFA0FCFB}" type="datetime1">
               <a:rPr lang="en-US" smtClean="0"/>
-              <a:t>3/28/11</a:t>
+              <a:t>3/29/11</a:t>
             </a:fld>
             <a:endParaRPr lang="en-US"/>
           </a:p>
@@ -1283,7 +1285,7 @@
           <a:p>
             <a:fld id="{7D6B2795-04C6-48FF-AAEE-36382F45149E}" type="datetime1">
               <a:rPr lang="en-US" smtClean="0"/>
-              <a:t>3/28/11</a:t>
+              <a:t>3/29/11</a:t>
             </a:fld>
             <a:endParaRPr lang="en-US"/>
           </a:p>
@@ -1469,7 +1471,7 @@
           <a:p>
             <a:fld id="{733691F5-153C-4E70-99C4-93B3FDFCCD2C}" type="datetime1">
               <a:rPr lang="en-US" smtClean="0"/>
-              <a:t>3/28/11</a:t>
+              <a:t>3/29/11</a:t>
             </a:fld>
             <a:endParaRPr lang="en-US"/>
           </a:p>
@@ -1666,7 +1668,7 @@
           <a:p>
             <a:fld id="{916CC03D-49BD-43FE-8C9D-E6228581FBCC}" type="datetime1">
               <a:rPr lang="en-US" smtClean="0"/>
-              <a:t>3/28/11</a:t>
+              <a:t>3/29/11</a:t>
             </a:fld>
             <a:endParaRPr lang="en-US"/>
           </a:p>
@@ -1796,7 +1798,7 @@
           <a:p>
             <a:fld id="{5CEADC6E-C86C-4AF1-9C34-C6597A341D41}" type="datetime1">
               <a:rPr lang="en-US" smtClean="0"/>
-              <a:t>3/28/11</a:t>
+              <a:t>3/29/11</a:t>
             </a:fld>
             <a:endParaRPr lang="en-US"/>
           </a:p>
@@ -2189,7 +2191,7 @@
           <a:p>
             <a:fld id="{85797D71-BCD2-4E20-BB4D-AA12CC768DCB}" type="datetime1">
               <a:rPr lang="en-US" smtClean="0"/>
-              <a:t>3/28/11</a:t>
+              <a:t>3/29/11</a:t>
             </a:fld>
             <a:endParaRPr lang="en-US"/>
           </a:p>
@@ -2638,7 +2640,7 @@
           <a:p>
             <a:fld id="{CFCD9B06-57FB-4FCB-8AEB-322DEBABE2D3}" type="datetime1">
               <a:rPr lang="en-US" smtClean="0"/>
-              <a:t>3/28/11</a:t>
+              <a:t>3/29/11</a:t>
             </a:fld>
             <a:endParaRPr lang="en-US"/>
           </a:p>
@@ -2767,7 +2769,7 @@
           <a:p>
             <a:fld id="{F75032CE-DD6D-4E27-8AFB-2C62C88659ED}" type="datetime1">
               <a:rPr lang="en-US" smtClean="0"/>
-              <a:t>3/28/11</a:t>
+              <a:t>3/29/11</a:t>
             </a:fld>
             <a:endParaRPr lang="en-US"/>
           </a:p>
@@ -2868,7 +2870,7 @@
           <a:p>
             <a:fld id="{0F4A0D96-B0A4-479F-96C3-0502F443BD04}" type="datetime1">
               <a:rPr lang="en-US" smtClean="0"/>
-              <a:t>3/28/11</a:t>
+              <a:t>3/29/11</a:t>
             </a:fld>
             <a:endParaRPr lang="en-US"/>
           </a:p>
@@ -3163,7 +3165,7 @@
           <a:p>
             <a:fld id="{FC676B31-12ED-49F5-92AC-76145044EF31}" type="datetime1">
               <a:rPr lang="en-US" smtClean="0"/>
-              <a:t>3/28/11</a:t>
+              <a:t>3/29/11</a:t>
             </a:fld>
             <a:endParaRPr lang="en-US"/>
           </a:p>
@@ -3436,7 +3438,7 @@
           <a:p>
             <a:fld id="{4579E015-87B4-44DF-8AEC-16E7D958B4EB}" type="datetime1">
               <a:rPr lang="en-US" smtClean="0"/>
-              <a:t>3/28/11</a:t>
+              <a:t>3/29/11</a:t>
             </a:fld>
             <a:endParaRPr lang="en-US"/>
           </a:p>
@@ -3722,7 +3724,7 @@
           <a:p>
             <a:fld id="{B063C409-8F1D-4059-AE3B-CEB617E734A5}" type="datetime1">
               <a:rPr lang="en-US" smtClean="0"/>
-              <a:t>3/28/11</a:t>
+              <a:t>3/29/11</a:t>
             </a:fld>
             <a:endParaRPr lang="en-US"/>
           </a:p>
@@ -5739,7 +5741,7 @@
         </p:blipFill>
         <p:spPr>
           <a:xfrm>
-            <a:off x="5105400" y="2895600"/>
+            <a:off x="5105400" y="4648200"/>
             <a:ext cx="3485788" cy="1227787"/>
           </a:xfrm>
           <a:prstGeom prst="rect">
@@ -5781,8 +5783,8 @@
         </p:nvSpPr>
         <p:spPr>
           <a:xfrm>
-            <a:off x="4800600" y="1295400"/>
-            <a:ext cx="4191000" cy="5105400"/>
+            <a:off x="4648200" y="2438400"/>
+            <a:ext cx="3962400" cy="1905000"/>
           </a:xfrm>
           <a:prstGeom prst="rect">
             <a:avLst/>
@@ -6052,34 +6054,6 @@
             </a:pPr>
             <a:endParaRPr lang="en-US" sz="1600" dirty="0"/>
           </a:p>
-          <a:p>
-            <a:r>
-              <a:rPr lang="en-US" sz="2000" dirty="0" smtClean="0"/>
-              <a:t>Access macros: -g3</a:t>
-            </a:r>
-          </a:p>
-          <a:p>
-            <a:r>
-              <a:rPr lang="en-US" sz="2000" dirty="0" smtClean="0"/>
-              <a:t>Reference counting: </a:t>
-            </a:r>
-          </a:p>
-          <a:p>
-            <a:pPr lvl="1"/>
-            <a:r>
-              <a:rPr lang="en-US" sz="1600" dirty="0" err="1" smtClean="0"/>
-              <a:t>Py_IncRef</a:t>
-            </a:r>
-            <a:r>
-              <a:rPr lang="en-US" sz="1600" dirty="0" smtClean="0"/>
-              <a:t>/</a:t>
-            </a:r>
-            <a:r>
-              <a:rPr lang="en-US" sz="1600" dirty="0" err="1" smtClean="0"/>
-              <a:t>Py_DecRef</a:t>
-            </a:r>
-            <a:endParaRPr lang="en-US" sz="1600" dirty="0" smtClean="0"/>
-          </a:p>
         </p:txBody>
       </p:sp>
     </p:spTree>
@@ -6256,6 +6230,352 @@
 </file>
 
 <file path=ppt/slides/slide20.xml><?xml version="1.0" encoding="utf-8"?>
+<p:sld xmlns:a="http://schemas.openxmlformats.org/drawingml/2006/main" xmlns:r="http://schemas.openxmlformats.org/officeDocument/2006/relationships" xmlns:p="http://schemas.openxmlformats.org/presentationml/2006/main">
+  <p:cSld>
+    <p:spTree>
+      <p:nvGrpSpPr>
+        <p:cNvPr id="1" name=""/>
+        <p:cNvGrpSpPr/>
+        <p:nvPr/>
+      </p:nvGrpSpPr>
+      <p:grpSpPr>
+        <a:xfrm>
+          <a:off x="0" y="0"/>
+          <a:ext cx="0" cy="0"/>
+          <a:chOff x="0" y="0"/>
+          <a:chExt cx="0" cy="0"/>
+        </a:xfrm>
+      </p:grpSpPr>
+      <p:sp>
+        <p:nvSpPr>
+          <p:cNvPr id="3" name="Title 2"/>
+          <p:cNvSpPr>
+            <a:spLocks noGrp="1"/>
+          </p:cNvSpPr>
+          <p:nvPr>
+            <p:ph type="title"/>
+          </p:nvPr>
+        </p:nvSpPr>
+        <p:spPr>
+          <a:xfrm>
+            <a:off x="1143000" y="304800"/>
+            <a:ext cx="6781800" cy="533400"/>
+          </a:xfrm>
+        </p:spPr>
+        <p:txBody>
+          <a:bodyPr/>
+          <a:lstStyle/>
+          <a:p>
+            <a:pPr algn="ctr"/>
+            <a:r>
+              <a:rPr lang="en-US" dirty="0" smtClean="0"/>
+              <a:t>Final Notes</a:t>
+            </a:r>
+            <a:endParaRPr lang="en-US" dirty="0"/>
+          </a:p>
+        </p:txBody>
+      </p:sp>
+      <p:pic>
+        <p:nvPicPr>
+          <p:cNvPr id="5" name="Picture 4"/>
+          <p:cNvPicPr>
+            <a:picLocks noChangeAspect="1"/>
+          </p:cNvPicPr>
+          <p:nvPr/>
+        </p:nvPicPr>
+        <p:blipFill>
+          <a:blip r:embed="rId2"/>
+          <a:stretch>
+            <a:fillRect/>
+          </a:stretch>
+        </p:blipFill>
+        <p:spPr>
+          <a:xfrm>
+            <a:off x="838200" y="2514600"/>
+            <a:ext cx="7772400" cy="3886200"/>
+          </a:xfrm>
+          <a:prstGeom prst="rect">
+            <a:avLst/>
+          </a:prstGeom>
+        </p:spPr>
+      </p:pic>
+      <p:sp>
+        <p:nvSpPr>
+          <p:cNvPr id="6" name="Content Placeholder 1"/>
+          <p:cNvSpPr txBox="1">
+            <a:spLocks/>
+          </p:cNvSpPr>
+          <p:nvPr/>
+        </p:nvSpPr>
+        <p:spPr>
+          <a:xfrm>
+            <a:off x="533400" y="990600"/>
+            <a:ext cx="8458200" cy="5562600"/>
+          </a:xfrm>
+          <a:prstGeom prst="rect">
+            <a:avLst/>
+          </a:prstGeom>
+        </p:spPr>
+        <p:txBody>
+          <a:bodyPr vert="horz" lIns="91440" tIns="45720" rIns="91440" bIns="45720" rtlCol="0" anchor="t">
+            <a:normAutofit/>
+          </a:bodyPr>
+          <a:lstStyle>
+            <a:lvl1pPr marL="182880" indent="-182880" algn="l" defTabSz="914400" rtl="0" eaLnBrk="1" latinLnBrk="0" hangingPunct="1">
+              <a:spcBef>
+                <a:spcPct val="20000"/>
+              </a:spcBef>
+              <a:buClr>
+                <a:schemeClr val="tx1">
+                  <a:lumMod val="50000"/>
+                  <a:lumOff val="50000"/>
+                </a:schemeClr>
+              </a:buClr>
+              <a:buFont typeface="Wingdings" pitchFamily="2" charset="2"/>
+              <a:buChar char="§"/>
+              <a:defRPr sz="1800" kern="1200">
+                <a:solidFill>
+                  <a:schemeClr val="tx1">
+                    <a:lumMod val="85000"/>
+                  </a:schemeClr>
+                </a:solidFill>
+                <a:latin typeface="+mn-lt"/>
+                <a:ea typeface="+mn-ea"/>
+                <a:cs typeface="+mn-cs"/>
+              </a:defRPr>
+            </a:lvl1pPr>
+            <a:lvl2pPr marL="411480" indent="-182880" algn="l" defTabSz="914400" rtl="0" eaLnBrk="1" latinLnBrk="0" hangingPunct="1">
+              <a:spcBef>
+                <a:spcPct val="20000"/>
+              </a:spcBef>
+              <a:buClr>
+                <a:schemeClr val="tx1">
+                  <a:lumMod val="50000"/>
+                  <a:lumOff val="50000"/>
+                </a:schemeClr>
+              </a:buClr>
+              <a:buFont typeface="Wingdings" pitchFamily="2" charset="2"/>
+              <a:buChar char="§"/>
+              <a:defRPr sz="1400" kern="1200">
+                <a:solidFill>
+                  <a:schemeClr val="tx1">
+                    <a:lumMod val="85000"/>
+                  </a:schemeClr>
+                </a:solidFill>
+                <a:latin typeface="+mn-lt"/>
+                <a:ea typeface="+mn-ea"/>
+                <a:cs typeface="+mn-cs"/>
+              </a:defRPr>
+            </a:lvl2pPr>
+            <a:lvl3pPr marL="594360" indent="-182880" algn="l" defTabSz="914400" rtl="0" eaLnBrk="1" latinLnBrk="0" hangingPunct="1">
+              <a:spcBef>
+                <a:spcPct val="20000"/>
+              </a:spcBef>
+              <a:buClr>
+                <a:schemeClr val="tx1">
+                  <a:lumMod val="50000"/>
+                  <a:lumOff val="50000"/>
+                </a:schemeClr>
+              </a:buClr>
+              <a:buFont typeface="Wingdings" pitchFamily="2" charset="2"/>
+              <a:buChar char="§"/>
+              <a:defRPr sz="1400" kern="1200">
+                <a:solidFill>
+                  <a:schemeClr val="tx1">
+                    <a:lumMod val="85000"/>
+                  </a:schemeClr>
+                </a:solidFill>
+                <a:latin typeface="+mn-lt"/>
+                <a:ea typeface="+mn-ea"/>
+                <a:cs typeface="+mn-cs"/>
+              </a:defRPr>
+            </a:lvl3pPr>
+            <a:lvl4pPr marL="777240" indent="-182880" algn="l" defTabSz="914400" rtl="0" eaLnBrk="1" latinLnBrk="0" hangingPunct="1">
+              <a:spcBef>
+                <a:spcPct val="20000"/>
+              </a:spcBef>
+              <a:buClr>
+                <a:schemeClr val="tx1">
+                  <a:lumMod val="50000"/>
+                  <a:lumOff val="50000"/>
+                </a:schemeClr>
+              </a:buClr>
+              <a:buFont typeface="Wingdings" pitchFamily="2" charset="2"/>
+              <a:buChar char="§"/>
+              <a:defRPr sz="1400" kern="1200">
+                <a:solidFill>
+                  <a:schemeClr val="tx1">
+                    <a:lumMod val="85000"/>
+                  </a:schemeClr>
+                </a:solidFill>
+                <a:latin typeface="+mn-lt"/>
+                <a:ea typeface="+mn-ea"/>
+                <a:cs typeface="+mn-cs"/>
+              </a:defRPr>
+            </a:lvl4pPr>
+            <a:lvl5pPr marL="960120" indent="-182880" algn="l" defTabSz="914400" rtl="0" eaLnBrk="1" latinLnBrk="0" hangingPunct="1">
+              <a:spcBef>
+                <a:spcPct val="20000"/>
+              </a:spcBef>
+              <a:buClr>
+                <a:schemeClr val="tx1">
+                  <a:lumMod val="50000"/>
+                  <a:lumOff val="50000"/>
+                </a:schemeClr>
+              </a:buClr>
+              <a:buFont typeface="Wingdings" pitchFamily="2" charset="2"/>
+              <a:buChar char="§"/>
+              <a:defRPr sz="1400" kern="1200">
+                <a:solidFill>
+                  <a:schemeClr val="tx1">
+                    <a:lumMod val="85000"/>
+                  </a:schemeClr>
+                </a:solidFill>
+                <a:latin typeface="+mn-lt"/>
+                <a:ea typeface="+mn-ea"/>
+                <a:cs typeface="+mn-cs"/>
+              </a:defRPr>
+            </a:lvl5pPr>
+            <a:lvl6pPr marL="1143000" indent="-182880" algn="l" defTabSz="914400" rtl="0" eaLnBrk="1" latinLnBrk="0" hangingPunct="1">
+              <a:spcBef>
+                <a:spcPts val="288"/>
+              </a:spcBef>
+              <a:buClr>
+                <a:schemeClr val="tx1">
+                  <a:lumMod val="50000"/>
+                  <a:lumOff val="50000"/>
+                </a:schemeClr>
+              </a:buClr>
+              <a:buFont typeface="Wingdings" pitchFamily="2" charset="2"/>
+              <a:buChar char="§"/>
+              <a:defRPr sz="1400" kern="1200" baseline="0">
+                <a:solidFill>
+                  <a:schemeClr val="tx1"/>
+                </a:solidFill>
+                <a:latin typeface="+mn-lt"/>
+                <a:ea typeface="+mn-ea"/>
+                <a:cs typeface="+mn-cs"/>
+              </a:defRPr>
+            </a:lvl6pPr>
+            <a:lvl7pPr marL="1325880" indent="-182880" algn="l" defTabSz="914400" rtl="0" eaLnBrk="1" latinLnBrk="0" hangingPunct="1">
+              <a:spcBef>
+                <a:spcPts val="288"/>
+              </a:spcBef>
+              <a:buClr>
+                <a:schemeClr val="tx1">
+                  <a:lumMod val="50000"/>
+                  <a:lumOff val="50000"/>
+                </a:schemeClr>
+              </a:buClr>
+              <a:buFont typeface="Wingdings" pitchFamily="2" charset="2"/>
+              <a:buChar char="§"/>
+              <a:defRPr sz="1400" kern="1200" baseline="0">
+                <a:solidFill>
+                  <a:schemeClr val="tx1"/>
+                </a:solidFill>
+                <a:latin typeface="+mn-lt"/>
+                <a:ea typeface="+mn-ea"/>
+                <a:cs typeface="+mn-cs"/>
+              </a:defRPr>
+            </a:lvl7pPr>
+            <a:lvl8pPr marL="1508760" indent="-182880" algn="l" defTabSz="914400" rtl="0" eaLnBrk="1" latinLnBrk="0" hangingPunct="1">
+              <a:spcBef>
+                <a:spcPts val="288"/>
+              </a:spcBef>
+              <a:buClr>
+                <a:schemeClr val="tx1">
+                  <a:lumMod val="50000"/>
+                  <a:lumOff val="50000"/>
+                </a:schemeClr>
+              </a:buClr>
+              <a:buFont typeface="Wingdings" pitchFamily="2" charset="2"/>
+              <a:buChar char="§"/>
+              <a:defRPr sz="1400" kern="1200" baseline="0">
+                <a:solidFill>
+                  <a:schemeClr val="tx1"/>
+                </a:solidFill>
+                <a:latin typeface="+mn-lt"/>
+                <a:ea typeface="+mn-ea"/>
+                <a:cs typeface="+mn-cs"/>
+              </a:defRPr>
+            </a:lvl8pPr>
+            <a:lvl9pPr marL="1691640" indent="-182880" algn="l" defTabSz="914400" rtl="0" eaLnBrk="1" latinLnBrk="0" hangingPunct="1">
+              <a:spcBef>
+                <a:spcPts val="288"/>
+              </a:spcBef>
+              <a:buClr>
+                <a:schemeClr val="tx1">
+                  <a:lumMod val="50000"/>
+                  <a:lumOff val="50000"/>
+                </a:schemeClr>
+              </a:buClr>
+              <a:buFont typeface="Wingdings" pitchFamily="2" charset="2"/>
+              <a:buChar char="§"/>
+              <a:defRPr sz="1400" kern="1200" baseline="0">
+                <a:solidFill>
+                  <a:schemeClr val="tx1"/>
+                </a:solidFill>
+                <a:latin typeface="+mn-lt"/>
+                <a:ea typeface="+mn-ea"/>
+                <a:cs typeface="+mn-cs"/>
+              </a:defRPr>
+            </a:lvl9pPr>
+          </a:lstStyle>
+          <a:p>
+            <a:r>
+              <a:rPr lang="en-US" sz="2000" dirty="0" smtClean="0"/>
+              <a:t>Access </a:t>
+            </a:r>
+            <a:r>
+              <a:rPr lang="en-US" sz="2000" dirty="0" smtClean="0"/>
+              <a:t>macros: -g3</a:t>
+            </a:r>
+          </a:p>
+          <a:p>
+            <a:r>
+              <a:rPr lang="en-US" sz="2000" dirty="0" smtClean="0"/>
+              <a:t>Reference counting: </a:t>
+            </a:r>
+          </a:p>
+          <a:p>
+            <a:pPr lvl="1"/>
+            <a:r>
+              <a:rPr lang="en-US" sz="1600" dirty="0" err="1" smtClean="0"/>
+              <a:t>Py_IncRef</a:t>
+            </a:r>
+            <a:r>
+              <a:rPr lang="en-US" sz="1600" dirty="0" smtClean="0"/>
+              <a:t>/</a:t>
+            </a:r>
+            <a:r>
+              <a:rPr lang="en-US" sz="1600" dirty="0" err="1" smtClean="0"/>
+              <a:t>Py_DecRef</a:t>
+            </a:r>
+            <a:endParaRPr lang="en-US" sz="1600" dirty="0" smtClean="0"/>
+          </a:p>
+          <a:p>
+            <a:r>
+              <a:rPr lang="en-US" sz="2000" dirty="0" smtClean="0"/>
+              <a:t>“unwind-on-signal”</a:t>
+            </a:r>
+            <a:endParaRPr lang="en-US" sz="2000" dirty="0" smtClean="0"/>
+          </a:p>
+        </p:txBody>
+      </p:sp>
+    </p:spTree>
+    <p:extLst>
+      <p:ext uri="{BB962C8B-B14F-4D97-AF65-F5344CB8AC3E}">
+        <p14:creationId xmlns:p14="http://schemas.microsoft.com/office/powerpoint/2010/main" val="420660778"/>
+      </p:ext>
+    </p:extLst>
+  </p:cSld>
+  <p:clrMapOvr>
+    <a:masterClrMapping/>
+  </p:clrMapOvr>
+</p:sld>
+</file>
+
+<file path=ppt/slides/slide21.xml><?xml version="1.0" encoding="utf-8"?>
 <p:sld xmlns:a="http://schemas.openxmlformats.org/drawingml/2006/main" xmlns:r="http://schemas.openxmlformats.org/officeDocument/2006/relationships" xmlns:p="http://schemas.openxmlformats.org/presentationml/2006/main">
   <p:cSld>
     <p:bg>

</xml_diff>

<commit_message>
Debug tut added pdf
</commit_message>
<xml_diff>
--- a/Multi-Level Debugging for Cython.pptx
+++ b/Multi-Level Debugging for Cython.pptx
@@ -243,7 +243,7 @@
           <a:p>
             <a:fld id="{7B828FF2-D90A-489D-867E-862A66822F8F}" type="datetimeFigureOut">
               <a:rPr lang="en-US" smtClean="0"/>
-              <a:t>3/29/11</a:t>
+              <a:t>3/29/2011</a:t>
             </a:fld>
             <a:endParaRPr lang="en-US"/>
           </a:p>
@@ -1095,7 +1095,7 @@
           <a:p>
             <a:fld id="{3422F140-FF59-4402-B4B9-5DBFDFA0FCFB}" type="datetime1">
               <a:rPr lang="en-US" smtClean="0"/>
-              <a:t>3/29/11</a:t>
+              <a:t>3/29/2011</a:t>
             </a:fld>
             <a:endParaRPr lang="en-US"/>
           </a:p>
@@ -1169,7 +1169,7 @@
   <p:timing>
     <p:tnLst>
       <p:par>
-        <p:cTn xmlns:p14="http://schemas.microsoft.com/office/powerpoint/2010/main" id="1" dur="indefinite" restart="never" nodeType="tmRoot"/>
+        <p:cTn id="1" dur="indefinite" restart="never" nodeType="tmRoot"/>
       </p:par>
     </p:tnLst>
   </p:timing>
@@ -1285,7 +1285,7 @@
           <a:p>
             <a:fld id="{7D6B2795-04C6-48FF-AAEE-36382F45149E}" type="datetime1">
               <a:rPr lang="en-US" smtClean="0"/>
-              <a:t>3/29/11</a:t>
+              <a:t>3/29/2011</a:t>
             </a:fld>
             <a:endParaRPr lang="en-US"/>
           </a:p>
@@ -1345,7 +1345,7 @@
   <p:timing>
     <p:tnLst>
       <p:par>
-        <p:cTn xmlns:p14="http://schemas.microsoft.com/office/powerpoint/2010/main" id="1" dur="indefinite" restart="never" nodeType="tmRoot"/>
+        <p:cTn id="1" dur="indefinite" restart="never" nodeType="tmRoot"/>
       </p:par>
     </p:tnLst>
   </p:timing>
@@ -1471,7 +1471,7 @@
           <a:p>
             <a:fld id="{733691F5-153C-4E70-99C4-93B3FDFCCD2C}" type="datetime1">
               <a:rPr lang="en-US" smtClean="0"/>
-              <a:t>3/29/11</a:t>
+              <a:t>3/29/2011</a:t>
             </a:fld>
             <a:endParaRPr lang="en-US"/>
           </a:p>
@@ -1531,7 +1531,7 @@
   <p:timing>
     <p:tnLst>
       <p:par>
-        <p:cTn xmlns:p14="http://schemas.microsoft.com/office/powerpoint/2010/main" id="1" dur="indefinite" restart="never" nodeType="tmRoot"/>
+        <p:cTn id="1" dur="indefinite" restart="never" nodeType="tmRoot"/>
       </p:par>
     </p:tnLst>
   </p:timing>
@@ -1668,7 +1668,7 @@
           <a:p>
             <a:fld id="{916CC03D-49BD-43FE-8C9D-E6228581FBCC}" type="datetime1">
               <a:rPr lang="en-US" smtClean="0"/>
-              <a:t>3/29/11</a:t>
+              <a:t>3/29/2011</a:t>
             </a:fld>
             <a:endParaRPr lang="en-US"/>
           </a:p>
@@ -1728,7 +1728,7 @@
   <p:timing>
     <p:tnLst>
       <p:par>
-        <p:cTn xmlns:p14="http://schemas.microsoft.com/office/powerpoint/2010/main" id="1" dur="indefinite" restart="never" nodeType="tmRoot"/>
+        <p:cTn id="1" dur="indefinite" restart="never" nodeType="tmRoot"/>
       </p:par>
     </p:tnLst>
   </p:timing>
@@ -1798,7 +1798,7 @@
           <a:p>
             <a:fld id="{5CEADC6E-C86C-4AF1-9C34-C6597A341D41}" type="datetime1">
               <a:rPr lang="en-US" smtClean="0"/>
-              <a:t>3/29/11</a:t>
+              <a:t>3/29/2011</a:t>
             </a:fld>
             <a:endParaRPr lang="en-US"/>
           </a:p>
@@ -1948,7 +1948,7 @@
   <p:timing>
     <p:tnLst>
       <p:par>
-        <p:cTn xmlns:p14="http://schemas.microsoft.com/office/powerpoint/2010/main" id="1" dur="indefinite" restart="never" nodeType="tmRoot"/>
+        <p:cTn id="1" dur="indefinite" restart="never" nodeType="tmRoot"/>
       </p:par>
     </p:tnLst>
   </p:timing>
@@ -2191,7 +2191,7 @@
           <a:p>
             <a:fld id="{85797D71-BCD2-4E20-BB4D-AA12CC768DCB}" type="datetime1">
               <a:rPr lang="en-US" smtClean="0"/>
-              <a:t>3/29/11</a:t>
+              <a:t>3/29/2011</a:t>
             </a:fld>
             <a:endParaRPr lang="en-US"/>
           </a:p>
@@ -2251,7 +2251,7 @@
   <p:timing>
     <p:tnLst>
       <p:par>
-        <p:cTn xmlns:p14="http://schemas.microsoft.com/office/powerpoint/2010/main" id="1" dur="indefinite" restart="never" nodeType="tmRoot"/>
+        <p:cTn id="1" dur="indefinite" restart="never" nodeType="tmRoot"/>
       </p:par>
     </p:tnLst>
   </p:timing>
@@ -2640,7 +2640,7 @@
           <a:p>
             <a:fld id="{CFCD9B06-57FB-4FCB-8AEB-322DEBABE2D3}" type="datetime1">
               <a:rPr lang="en-US" smtClean="0"/>
-              <a:t>3/29/11</a:t>
+              <a:t>3/29/2011</a:t>
             </a:fld>
             <a:endParaRPr lang="en-US"/>
           </a:p>
@@ -2700,7 +2700,7 @@
   <p:timing>
     <p:tnLst>
       <p:par>
-        <p:cTn xmlns:p14="http://schemas.microsoft.com/office/powerpoint/2010/main" id="1" dur="indefinite" restart="never" nodeType="tmRoot"/>
+        <p:cTn id="1" dur="indefinite" restart="never" nodeType="tmRoot"/>
       </p:par>
     </p:tnLst>
   </p:timing>
@@ -2769,7 +2769,7 @@
           <a:p>
             <a:fld id="{F75032CE-DD6D-4E27-8AFB-2C62C88659ED}" type="datetime1">
               <a:rPr lang="en-US" smtClean="0"/>
-              <a:t>3/29/11</a:t>
+              <a:t>3/29/2011</a:t>
             </a:fld>
             <a:endParaRPr lang="en-US"/>
           </a:p>
@@ -2829,7 +2829,7 @@
   <p:timing>
     <p:tnLst>
       <p:par>
-        <p:cTn xmlns:p14="http://schemas.microsoft.com/office/powerpoint/2010/main" id="1" dur="indefinite" restart="never" nodeType="tmRoot"/>
+        <p:cTn id="1" dur="indefinite" restart="never" nodeType="tmRoot"/>
       </p:par>
     </p:tnLst>
   </p:timing>
@@ -2870,7 +2870,7 @@
           <a:p>
             <a:fld id="{0F4A0D96-B0A4-479F-96C3-0502F443BD04}" type="datetime1">
               <a:rPr lang="en-US" smtClean="0"/>
-              <a:t>3/29/11</a:t>
+              <a:t>3/29/2011</a:t>
             </a:fld>
             <a:endParaRPr lang="en-US"/>
           </a:p>
@@ -2930,7 +2930,7 @@
   <p:timing>
     <p:tnLst>
       <p:par>
-        <p:cTn xmlns:p14="http://schemas.microsoft.com/office/powerpoint/2010/main" id="1" dur="indefinite" restart="never" nodeType="tmRoot"/>
+        <p:cTn id="1" dur="indefinite" restart="never" nodeType="tmRoot"/>
       </p:par>
     </p:tnLst>
   </p:timing>
@@ -3165,7 +3165,7 @@
           <a:p>
             <a:fld id="{FC676B31-12ED-49F5-92AC-76145044EF31}" type="datetime1">
               <a:rPr lang="en-US" smtClean="0"/>
-              <a:t>3/29/11</a:t>
+              <a:t>3/29/2011</a:t>
             </a:fld>
             <a:endParaRPr lang="en-US"/>
           </a:p>
@@ -3225,7 +3225,7 @@
   <p:timing>
     <p:tnLst>
       <p:par>
-        <p:cTn xmlns:p14="http://schemas.microsoft.com/office/powerpoint/2010/main" id="1" dur="indefinite" restart="never" nodeType="tmRoot"/>
+        <p:cTn id="1" dur="indefinite" restart="never" nodeType="tmRoot"/>
       </p:par>
     </p:tnLst>
   </p:timing>
@@ -3438,7 +3438,7 @@
           <a:p>
             <a:fld id="{4579E015-87B4-44DF-8AEC-16E7D958B4EB}" type="datetime1">
               <a:rPr lang="en-US" smtClean="0"/>
-              <a:t>3/29/11</a:t>
+              <a:t>3/29/2011</a:t>
             </a:fld>
             <a:endParaRPr lang="en-US"/>
           </a:p>
@@ -3498,7 +3498,7 @@
   <p:timing>
     <p:tnLst>
       <p:par>
-        <p:cTn xmlns:p14="http://schemas.microsoft.com/office/powerpoint/2010/main" id="1" dur="indefinite" restart="never" nodeType="tmRoot"/>
+        <p:cTn id="1" dur="indefinite" restart="never" nodeType="tmRoot"/>
       </p:par>
     </p:tnLst>
   </p:timing>
@@ -3724,7 +3724,7 @@
           <a:p>
             <a:fld id="{B063C409-8F1D-4059-AE3B-CEB617E734A5}" type="datetime1">
               <a:rPr lang="en-US" smtClean="0"/>
-              <a:t>3/29/11</a:t>
+              <a:t>3/29/2011</a:t>
             </a:fld>
             <a:endParaRPr lang="en-US"/>
           </a:p>
@@ -3788,7 +3788,7 @@
   <p:timing>
     <p:tnLst>
       <p:par>
-        <p:cTn xmlns:p14="http://schemas.microsoft.com/office/powerpoint/2010/main" id="1" dur="indefinite" restart="never" nodeType="tmRoot"/>
+        <p:cTn id="1" dur="indefinite" restart="never" nodeType="tmRoot"/>
       </p:par>
     </p:tnLst>
   </p:timing>
@@ -4208,13 +4208,13 @@
   <p:clrMapOvr>
     <a:masterClrMapping/>
   </p:clrMapOvr>
-  <p:transition xmlns:p14="http://schemas.microsoft.com/office/powerpoint/2010/main" spd="slow">
+  <p:transition spd="slow">
     <p:cover/>
   </p:transition>
   <p:timing>
     <p:tnLst>
       <p:par>
-        <p:cTn xmlns:p14="http://schemas.microsoft.com/office/powerpoint/2010/main" id="1" dur="indefinite" restart="never" nodeType="tmRoot"/>
+        <p:cTn id="1" dur="indefinite" restart="never" nodeType="tmRoot"/>
       </p:par>
     </p:tnLst>
   </p:timing>
@@ -4275,7 +4275,7 @@
   <p:timing>
     <p:tnLst>
       <p:par>
-        <p:cTn xmlns:p14="http://schemas.microsoft.com/office/powerpoint/2010/main" id="1" dur="indefinite" restart="never" nodeType="tmRoot"/>
+        <p:cTn id="1" dur="indefinite" restart="never" nodeType="tmRoot"/>
       </p:par>
     </p:tnLst>
   </p:timing>
@@ -4386,6 +4386,13 @@
   <p:clrMapOvr>
     <a:masterClrMapping/>
   </p:clrMapOvr>
+  <p:timing>
+    <p:tnLst>
+      <p:par>
+        <p:cTn id="1" dur="indefinite" restart="never" nodeType="tmRoot"/>
+      </p:par>
+    </p:tnLst>
+  </p:timing>
 </p:sld>
 </file>
 
@@ -4480,7 +4487,7 @@
   <p:timing>
     <p:tnLst>
       <p:par>
-        <p:cTn xmlns:p14="http://schemas.microsoft.com/office/powerpoint/2010/main" id="1" dur="indefinite" restart="never" nodeType="tmRoot"/>
+        <p:cTn id="1" dur="indefinite" restart="never" nodeType="tmRoot"/>
       </p:par>
     </p:tnLst>
   </p:timing>
@@ -4578,7 +4585,7 @@
   <p:timing>
     <p:tnLst>
       <p:par>
-        <p:cTn xmlns:p14="http://schemas.microsoft.com/office/powerpoint/2010/main" id="1" dur="indefinite" restart="never" nodeType="tmRoot"/>
+        <p:cTn id="1" dur="indefinite" restart="never" nodeType="tmRoot"/>
       </p:par>
     </p:tnLst>
   </p:timing>
@@ -4676,7 +4683,7 @@
   <p:timing>
     <p:tnLst>
       <p:par>
-        <p:cTn xmlns:p14="http://schemas.microsoft.com/office/powerpoint/2010/main" id="1" dur="indefinite" restart="never" nodeType="tmRoot"/>
+        <p:cTn id="1" dur="indefinite" restart="never" nodeType="tmRoot"/>
       </p:par>
     </p:tnLst>
   </p:timing>
@@ -4769,6 +4776,13 @@
   <p:clrMapOvr>
     <a:masterClrMapping/>
   </p:clrMapOvr>
+  <p:timing>
+    <p:tnLst>
+      <p:par>
+        <p:cTn id="1" dur="indefinite" restart="never" nodeType="tmRoot"/>
+      </p:par>
+    </p:tnLst>
+  </p:timing>
 </p:sld>
 </file>
 
@@ -5083,6 +5097,13 @@
   <p:clrMapOvr>
     <a:masterClrMapping/>
   </p:clrMapOvr>
+  <p:timing>
+    <p:tnLst>
+      <p:par>
+        <p:cTn id="1" dur="indefinite" restart="never" nodeType="tmRoot"/>
+      </p:par>
+    </p:tnLst>
+  </p:timing>
 </p:sld>
 </file>
 
@@ -5138,14 +5159,14 @@
           </a:ln>
           <a:effectLst/>
           <a:extLst>
-            <a:ext uri="{909E8E84-426E-40dd-AFC4-6F175D3DCCD1}">
+            <a:ext uri="{909E8E84-426E-40DD-AFC4-6F175D3DCCD1}">
               <a14:hiddenFill xmlns:a14="http://schemas.microsoft.com/office/drawing/2010/main">
                 <a:solidFill>
                   <a:schemeClr val="accent1"/>
                 </a:solidFill>
               </a14:hiddenFill>
             </a:ext>
-            <a:ext uri="{91240B29-F687-4f45-9708-019B960494DF}">
+            <a:ext uri="{91240B29-F687-4F45-9708-019B960494DF}">
               <a14:hiddenLine xmlns:a14="http://schemas.microsoft.com/office/drawing/2010/main" w="9525">
                 <a:solidFill>
                   <a:schemeClr val="tx1"/>
@@ -5155,7 +5176,7 @@
                 <a:tailEnd/>
               </a14:hiddenLine>
             </a:ext>
-            <a:ext uri="{AF507438-7753-43e0-B8FC-AC1667EBCBE1}">
+            <a:ext uri="{AF507438-7753-43E0-B8FC-AC1667EBCBE1}">
               <a14:hiddenEffects xmlns:a14="http://schemas.microsoft.com/office/drawing/2010/main">
                 <a:effectLst>
                   <a:outerShdw dist="35921" dir="2700000" algn="ctr" rotWithShape="0">
@@ -5231,14 +5252,14 @@
           </a:ln>
           <a:effectLst/>
           <a:extLst>
-            <a:ext uri="{909E8E84-426E-40dd-AFC4-6F175D3DCCD1}">
+            <a:ext uri="{909E8E84-426E-40DD-AFC4-6F175D3DCCD1}">
               <a14:hiddenFill xmlns:a14="http://schemas.microsoft.com/office/drawing/2010/main">
                 <a:solidFill>
                   <a:schemeClr val="accent1"/>
                 </a:solidFill>
               </a14:hiddenFill>
             </a:ext>
-            <a:ext uri="{91240B29-F687-4f45-9708-019B960494DF}">
+            <a:ext uri="{91240B29-F687-4F45-9708-019B960494DF}">
               <a14:hiddenLine xmlns:a14="http://schemas.microsoft.com/office/drawing/2010/main" w="9525">
                 <a:solidFill>
                   <a:schemeClr val="tx1"/>
@@ -5248,7 +5269,7 @@
                 <a:tailEnd/>
               </a14:hiddenLine>
             </a:ext>
-            <a:ext uri="{AF507438-7753-43e0-B8FC-AC1667EBCBE1}">
+            <a:ext uri="{AF507438-7753-43E0-B8FC-AC1667EBCBE1}">
               <a14:hiddenEffects xmlns:a14="http://schemas.microsoft.com/office/drawing/2010/main">
                 <a:effectLst>
                   <a:outerShdw dist="35921" dir="2700000" algn="ctr" rotWithShape="0">
@@ -5273,7 +5294,7 @@
   <p:timing>
     <p:tnLst>
       <p:par>
-        <p:cTn xmlns:p14="http://schemas.microsoft.com/office/powerpoint/2010/main" id="1" dur="indefinite" restart="never" nodeType="tmRoot">
+        <p:cTn id="1" dur="indefinite" restart="never" nodeType="tmRoot">
           <p:childTnLst>
             <p:seq concurrent="1" nextAc="seek">
               <p:cTn id="2" dur="indefinite" nodeType="mainSeq">
@@ -5491,14 +5512,14 @@
           </a:ln>
           <a:effectLst/>
           <a:extLst>
-            <a:ext uri="{909E8E84-426E-40dd-AFC4-6F175D3DCCD1}">
+            <a:ext uri="{909E8E84-426E-40DD-AFC4-6F175D3DCCD1}">
               <a14:hiddenFill xmlns:a14="http://schemas.microsoft.com/office/drawing/2010/main">
                 <a:solidFill>
                   <a:schemeClr val="accent1"/>
                 </a:solidFill>
               </a14:hiddenFill>
             </a:ext>
-            <a:ext uri="{91240B29-F687-4f45-9708-019B960494DF}">
+            <a:ext uri="{91240B29-F687-4F45-9708-019B960494DF}">
               <a14:hiddenLine xmlns:a14="http://schemas.microsoft.com/office/drawing/2010/main" w="9525">
                 <a:solidFill>
                   <a:schemeClr val="tx1"/>
@@ -5508,7 +5529,7 @@
                 <a:tailEnd/>
               </a14:hiddenLine>
             </a:ext>
-            <a:ext uri="{AF507438-7753-43e0-B8FC-AC1667EBCBE1}">
+            <a:ext uri="{AF507438-7753-43E0-B8FC-AC1667EBCBE1}">
               <a14:hiddenEffects xmlns:a14="http://schemas.microsoft.com/office/drawing/2010/main">
                 <a:effectLst>
                   <a:outerShdw dist="35921" dir="2700000" algn="ctr" rotWithShape="0">
@@ -5563,7 +5584,7 @@
   <p:timing>
     <p:tnLst>
       <p:par>
-        <p:cTn xmlns:p14="http://schemas.microsoft.com/office/powerpoint/2010/main" id="1" dur="indefinite" restart="never" nodeType="tmRoot"/>
+        <p:cTn id="1" dur="indefinite" restart="never" nodeType="tmRoot"/>
       </p:par>
     </p:tnLst>
   </p:timing>
@@ -5765,7 +5786,7 @@
         </p:blipFill>
         <p:spPr>
           <a:xfrm>
-            <a:off x="990600" y="3124200"/>
+            <a:off x="990600" y="2914650"/>
             <a:ext cx="3060700" cy="190500"/>
           </a:xfrm>
           <a:prstGeom prst="rect">
@@ -6069,7 +6090,7 @@
   <p:timing>
     <p:tnLst>
       <p:par>
-        <p:cTn xmlns:p14="http://schemas.microsoft.com/office/powerpoint/2010/main" id="1" dur="indefinite" restart="never" nodeType="tmRoot"/>
+        <p:cTn id="1" dur="indefinite" restart="never" nodeType="tmRoot"/>
       </p:par>
     </p:tnLst>
   </p:timing>
@@ -6222,7 +6243,7 @@
   <p:timing>
     <p:tnLst>
       <p:par>
-        <p:cTn xmlns:p14="http://schemas.microsoft.com/office/powerpoint/2010/main" id="1" dur="indefinite" restart="never" nodeType="tmRoot"/>
+        <p:cTn id="1" dur="indefinite" restart="never" nodeType="tmRoot"/>
       </p:par>
     </p:tnLst>
   </p:timing>
@@ -6524,11 +6545,7 @@
           <a:p>
             <a:r>
               <a:rPr lang="en-US" sz="2000" dirty="0" smtClean="0"/>
-              <a:t>Access </a:t>
-            </a:r>
-            <a:r>
-              <a:rPr lang="en-US" sz="2000" dirty="0" smtClean="0"/>
-              <a:t>macros: -g3</a:t>
+              <a:t>Access macros: -g3</a:t>
             </a:r>
           </a:p>
           <a:p>
@@ -6558,7 +6575,6 @@
               <a:rPr lang="en-US" sz="2000" dirty="0" smtClean="0"/>
               <a:t>“unwind-on-signal”</a:t>
             </a:r>
-            <a:endParaRPr lang="en-US" sz="2000" dirty="0" smtClean="0"/>
           </a:p>
         </p:txBody>
       </p:sp>
@@ -6572,6 +6588,13 @@
   <p:clrMapOvr>
     <a:masterClrMapping/>
   </p:clrMapOvr>
+  <p:timing>
+    <p:tnLst>
+      <p:par>
+        <p:cTn id="1" dur="indefinite" restart="never" nodeType="tmRoot"/>
+      </p:par>
+    </p:tnLst>
+  </p:timing>
 </p:sld>
 </file>
 
@@ -7407,7 +7430,7 @@
   <p:timing>
     <p:tnLst>
       <p:par>
-        <p:cTn xmlns:p14="http://schemas.microsoft.com/office/powerpoint/2010/main" id="1" dur="indefinite" restart="never" nodeType="tmRoot"/>
+        <p:cTn id="1" dur="indefinite" restart="never" nodeType="tmRoot"/>
       </p:par>
     </p:tnLst>
   </p:timing>
@@ -7911,7 +7934,7 @@
   <p:timing>
     <p:tnLst>
       <p:par>
-        <p:cTn xmlns:p14="http://schemas.microsoft.com/office/powerpoint/2010/main" id="1" dur="indefinite" restart="never" nodeType="tmRoot">
+        <p:cTn id="1" dur="indefinite" restart="never" nodeType="tmRoot">
           <p:childTnLst>
             <p:seq concurrent="1" nextAc="seek">
               <p:cTn id="2" dur="indefinite" nodeType="mainSeq">
@@ -7929,7 +7952,7 @@
                             </p:stCondLst>
                             <p:childTnLst>
                               <p:par>
-                                <p:cTn id="5" presetID="1" presetClass="entr" presetSubtype="0" fill="hold" nodeType="clickEffect">
+                                <p:cTn id="5" presetID="1" presetClass="entr" presetSubtype="0" fill="hold" grpId="0" nodeType="clickEffect">
                                   <p:stCondLst>
                                     <p:cond delay="0"/>
                                   </p:stCondLst>
@@ -7942,109 +7965,7 @@
                                           </p:stCondLst>
                                         </p:cTn>
                                         <p:tgtEl>
-                                          <p:spTgt spid="5">
-                                            <p:txEl>
-                                              <p:pRg st="0" end="0"/>
-                                            </p:txEl>
-                                          </p:spTgt>
-                                        </p:tgtEl>
-                                        <p:attrNameLst>
-                                          <p:attrName>style.visibility</p:attrName>
-                                        </p:attrNameLst>
-                                      </p:cBhvr>
-                                      <p:to>
-                                        <p:strVal val="visible"/>
-                                      </p:to>
-                                    </p:set>
-                                  </p:childTnLst>
-                                </p:cTn>
-                              </p:par>
-                            </p:childTnLst>
-                          </p:cTn>
-                        </p:par>
-                      </p:childTnLst>
-                    </p:cTn>
-                  </p:par>
-                  <p:par>
-                    <p:cTn id="7" fill="hold">
-                      <p:stCondLst>
-                        <p:cond delay="indefinite"/>
-                      </p:stCondLst>
-                      <p:childTnLst>
-                        <p:par>
-                          <p:cTn id="8" fill="hold">
-                            <p:stCondLst>
-                              <p:cond delay="0"/>
-                            </p:stCondLst>
-                            <p:childTnLst>
-                              <p:par>
-                                <p:cTn id="9" presetID="1" presetClass="entr" presetSubtype="0" fill="hold" nodeType="clickEffect">
-                                  <p:stCondLst>
-                                    <p:cond delay="0"/>
-                                  </p:stCondLst>
-                                  <p:childTnLst>
-                                    <p:set>
-                                      <p:cBhvr>
-                                        <p:cTn id="10" dur="1" fill="hold">
-                                          <p:stCondLst>
-                                            <p:cond delay="0"/>
-                                          </p:stCondLst>
-                                        </p:cTn>
-                                        <p:tgtEl>
-                                          <p:spTgt spid="5">
-                                            <p:txEl>
-                                              <p:pRg st="1" end="1"/>
-                                            </p:txEl>
-                                          </p:spTgt>
-                                        </p:tgtEl>
-                                        <p:attrNameLst>
-                                          <p:attrName>style.visibility</p:attrName>
-                                        </p:attrNameLst>
-                                      </p:cBhvr>
-                                      <p:to>
-                                        <p:strVal val="visible"/>
-                                      </p:to>
-                                    </p:set>
-                                  </p:childTnLst>
-                                </p:cTn>
-                              </p:par>
-                            </p:childTnLst>
-                          </p:cTn>
-                        </p:par>
-                      </p:childTnLst>
-                    </p:cTn>
-                  </p:par>
-                  <p:par>
-                    <p:cTn id="11" fill="hold">
-                      <p:stCondLst>
-                        <p:cond delay="indefinite"/>
-                      </p:stCondLst>
-                      <p:childTnLst>
-                        <p:par>
-                          <p:cTn id="12" fill="hold">
-                            <p:stCondLst>
-                              <p:cond delay="0"/>
-                            </p:stCondLst>
-                            <p:childTnLst>
-                              <p:par>
-                                <p:cTn id="13" presetID="1" presetClass="entr" presetSubtype="0" fill="hold" nodeType="clickEffect">
-                                  <p:stCondLst>
-                                    <p:cond delay="0"/>
-                                  </p:stCondLst>
-                                  <p:childTnLst>
-                                    <p:set>
-                                      <p:cBhvr>
-                                        <p:cTn id="14" dur="1" fill="hold">
-                                          <p:stCondLst>
-                                            <p:cond delay="0"/>
-                                          </p:stCondLst>
-                                        </p:cTn>
-                                        <p:tgtEl>
-                                          <p:spTgt spid="5">
-                                            <p:txEl>
-                                              <p:pRg st="2" end="2"/>
-                                            </p:txEl>
-                                          </p:spTgt>
+                                          <p:spTgt spid="5"/>
                                         </p:tgtEl>
                                         <p:attrNameLst>
                                           <p:attrName>style.visibility</p:attrName>
@@ -8084,6 +8005,9 @@
         </p:cTn>
       </p:par>
     </p:tnLst>
+    <p:bldLst>
+      <p:bldP spid="5" grpId="0"/>
+    </p:bldLst>
   </p:timing>
 </p:sld>
 </file>
@@ -8490,7 +8414,7 @@
   <p:timing>
     <p:tnLst>
       <p:par>
-        <p:cTn xmlns:p14="http://schemas.microsoft.com/office/powerpoint/2010/main" id="1" dur="indefinite" restart="never" nodeType="tmRoot">
+        <p:cTn id="1" dur="indefinite" restart="never" nodeType="tmRoot">
           <p:childTnLst>
             <p:seq concurrent="1" nextAc="seek">
               <p:cTn id="2" dur="indefinite" nodeType="mainSeq">
@@ -8957,7 +8881,7 @@
   <p:timing>
     <p:tnLst>
       <p:par>
-        <p:cTn xmlns:p14="http://schemas.microsoft.com/office/powerpoint/2010/main" id="1" dur="indefinite" restart="never" nodeType="tmRoot"/>
+        <p:cTn id="1" dur="indefinite" restart="never" nodeType="tmRoot"/>
       </p:par>
     </p:tnLst>
   </p:timing>
@@ -9084,7 +9008,7 @@
   <p:timing>
     <p:tnLst>
       <p:par>
-        <p:cTn xmlns:p14="http://schemas.microsoft.com/office/powerpoint/2010/main" id="1" dur="indefinite" restart="never" nodeType="tmRoot"/>
+        <p:cTn id="1" dur="indefinite" restart="never" nodeType="tmRoot"/>
       </p:par>
     </p:tnLst>
   </p:timing>
@@ -9696,7 +9620,7 @@
   <p:timing>
     <p:tnLst>
       <p:par>
-        <p:cTn xmlns:p14="http://schemas.microsoft.com/office/powerpoint/2010/main" id="1" dur="indefinite" restart="never" nodeType="tmRoot"/>
+        <p:cTn id="1" dur="indefinite" restart="never" nodeType="tmRoot"/>
       </p:par>
     </p:tnLst>
   </p:timing>
@@ -9783,6 +9707,13 @@
   <p:clrMapOvr>
     <a:masterClrMapping/>
   </p:clrMapOvr>
+  <p:timing>
+    <p:tnLst>
+      <p:par>
+        <p:cTn id="1" dur="indefinite" restart="never" nodeType="tmRoot"/>
+      </p:par>
+    </p:tnLst>
+  </p:timing>
 </p:sld>
 </file>
 
@@ -9881,7 +9812,7 @@
         </p:nvGraphicFramePr>
         <p:xfrm>
           <a:off x="1447800" y="914400"/>
-          <a:ext cx="6096000" cy="5323839"/>
+          <a:ext cx="6096000" cy="5323840"/>
         </p:xfrm>
         <a:graphic>
           <a:graphicData uri="http://schemas.openxmlformats.org/drawingml/2006/table">
@@ -10214,7 +10145,7 @@
   <p:timing>
     <p:tnLst>
       <p:par>
-        <p:cTn xmlns:p14="http://schemas.microsoft.com/office/powerpoint/2010/main" id="1" dur="indefinite" restart="never" nodeType="tmRoot"/>
+        <p:cTn id="1" dur="indefinite" restart="never" nodeType="tmRoot"/>
       </p:par>
     </p:tnLst>
   </p:timing>

</xml_diff>